<commit_message>
Slides zu Cmd und Sub
</commit_message>
<xml_diff>
--- a/ElmSession/Slides/Grafiken.pptx
+++ b/ElmSession/Slides/Grafiken.pptx
@@ -8,6 +8,8 @@
     <p:sldId id="256" r:id="rId2"/>
     <p:sldId id="257" r:id="rId3"/>
     <p:sldId id="258" r:id="rId4"/>
+    <p:sldId id="260" r:id="rId5"/>
+    <p:sldId id="259" r:id="rId6"/>
   </p:sldIdLst>
   <p:sldSz cx="12192000" cy="6858000"/>
   <p:notesSz cx="6858000" cy="9144000"/>
@@ -4975,6 +4977,1504 @@
 </p:sld>
 </file>
 
+<file path=ppt/slides/slide4.xml><?xml version="1.0" encoding="utf-8"?>
+<p:sld xmlns:a="http://schemas.openxmlformats.org/drawingml/2006/main" xmlns:r="http://schemas.openxmlformats.org/officeDocument/2006/relationships" xmlns:p="http://schemas.openxmlformats.org/presentationml/2006/main">
+  <p:cSld>
+    <p:spTree>
+      <p:nvGrpSpPr>
+        <p:cNvPr id="1" name=""/>
+        <p:cNvGrpSpPr/>
+        <p:nvPr/>
+      </p:nvGrpSpPr>
+      <p:grpSpPr>
+        <a:xfrm>
+          <a:off x="0" y="0"/>
+          <a:ext cx="0" cy="0"/>
+          <a:chOff x="0" y="0"/>
+          <a:chExt cx="0" cy="0"/>
+        </a:xfrm>
+      </p:grpSpPr>
+      <p:sp>
+        <p:nvSpPr>
+          <p:cNvPr id="2" name="Wolke 1"/>
+          <p:cNvSpPr/>
+          <p:nvPr/>
+        </p:nvSpPr>
+        <p:spPr>
+          <a:xfrm>
+            <a:off x="4884874" y="910394"/>
+            <a:ext cx="2499104" cy="1453620"/>
+          </a:xfrm>
+          <a:prstGeom prst="cloud">
+            <a:avLst/>
+          </a:prstGeom>
+          <a:solidFill>
+            <a:schemeClr val="accent1">
+              <a:lumMod val="20000"/>
+              <a:lumOff val="80000"/>
+            </a:schemeClr>
+          </a:solidFill>
+        </p:spPr>
+        <p:style>
+          <a:lnRef idx="2">
+            <a:schemeClr val="accent1">
+              <a:shade val="50000"/>
+            </a:schemeClr>
+          </a:lnRef>
+          <a:fillRef idx="1">
+            <a:schemeClr val="accent1"/>
+          </a:fillRef>
+          <a:effectRef idx="0">
+            <a:schemeClr val="accent1"/>
+          </a:effectRef>
+          <a:fontRef idx="minor">
+            <a:schemeClr val="lt1"/>
+          </a:fontRef>
+        </p:style>
+        <p:txBody>
+          <a:bodyPr rtlCol="0" anchor="ctr"/>
+          <a:lstStyle/>
+          <a:p>
+            <a:pPr algn="ctr"/>
+            <a:r>
+              <a:rPr lang="de-DE" b="1" dirty="0" smtClean="0">
+                <a:solidFill>
+                  <a:schemeClr val="accent1">
+                    <a:lumMod val="75000"/>
+                  </a:schemeClr>
+                </a:solidFill>
+              </a:rPr>
+              <a:t>Elm </a:t>
+            </a:r>
+            <a:r>
+              <a:rPr lang="de-DE" dirty="0" err="1" smtClean="0">
+                <a:solidFill>
+                  <a:schemeClr val="accent1">
+                    <a:lumMod val="75000"/>
+                  </a:schemeClr>
+                </a:solidFill>
+              </a:rPr>
+              <a:t>Runtime</a:t>
+            </a:r>
+            <a:endParaRPr lang="de-DE" b="1" dirty="0">
+              <a:solidFill>
+                <a:schemeClr val="accent1">
+                  <a:lumMod val="75000"/>
+                </a:schemeClr>
+              </a:solidFill>
+            </a:endParaRPr>
+          </a:p>
+        </p:txBody>
+      </p:sp>
+      <p:sp>
+        <p:nvSpPr>
+          <p:cNvPr id="3" name="Geschweifte Klammer links/rechts 2"/>
+          <p:cNvSpPr/>
+          <p:nvPr/>
+        </p:nvSpPr>
+        <p:spPr>
+          <a:xfrm>
+            <a:off x="2714125" y="3477062"/>
+            <a:ext cx="1041487" cy="618698"/>
+          </a:xfrm>
+          <a:prstGeom prst="bracePair">
+            <a:avLst>
+              <a:gd name="adj" fmla="val 9437"/>
+            </a:avLst>
+          </a:prstGeom>
+        </p:spPr>
+        <p:style>
+          <a:lnRef idx="1">
+            <a:schemeClr val="accent1"/>
+          </a:lnRef>
+          <a:fillRef idx="0">
+            <a:schemeClr val="accent1"/>
+          </a:fillRef>
+          <a:effectRef idx="0">
+            <a:schemeClr val="accent1"/>
+          </a:effectRef>
+          <a:fontRef idx="minor">
+            <a:schemeClr val="tx1"/>
+          </a:fontRef>
+        </p:style>
+        <p:txBody>
+          <a:bodyPr rtlCol="0" anchor="ctr"/>
+          <a:lstStyle/>
+          <a:p>
+            <a:r>
+              <a:rPr lang="de-DE" sz="1400" b="1" dirty="0" smtClean="0"/>
+              <a:t>…</a:t>
+            </a:r>
+            <a:endParaRPr lang="de-DE" sz="1400" b="1" dirty="0"/>
+          </a:p>
+        </p:txBody>
+      </p:sp>
+      <p:cxnSp>
+        <p:nvCxnSpPr>
+          <p:cNvPr id="4" name="Gerade Verbindung mit Pfeil 3"/>
+          <p:cNvCxnSpPr>
+            <a:stCxn id="3" idx="3"/>
+            <a:endCxn id="6" idx="1"/>
+          </p:cNvCxnSpPr>
+          <p:nvPr/>
+        </p:nvCxnSpPr>
+        <p:spPr>
+          <a:xfrm>
+            <a:off x="3755612" y="3786411"/>
+            <a:ext cx="729070" cy="0"/>
+          </a:xfrm>
+          <a:prstGeom prst="straightConnector1">
+            <a:avLst/>
+          </a:prstGeom>
+          <a:ln w="12700">
+            <a:tailEnd type="triangle"/>
+          </a:ln>
+        </p:spPr>
+        <p:style>
+          <a:lnRef idx="1">
+            <a:schemeClr val="dk1"/>
+          </a:lnRef>
+          <a:fillRef idx="0">
+            <a:schemeClr val="dk1"/>
+          </a:fillRef>
+          <a:effectRef idx="0">
+            <a:schemeClr val="dk1"/>
+          </a:effectRef>
+          <a:fontRef idx="minor">
+            <a:schemeClr val="tx1"/>
+          </a:fontRef>
+        </p:style>
+      </p:cxnSp>
+      <p:sp>
+        <p:nvSpPr>
+          <p:cNvPr id="6" name="Rechteck 5"/>
+          <p:cNvSpPr/>
+          <p:nvPr/>
+        </p:nvSpPr>
+        <p:spPr>
+          <a:xfrm>
+            <a:off x="4484682" y="3338736"/>
+            <a:ext cx="1857375" cy="895350"/>
+          </a:xfrm>
+          <a:prstGeom prst="rect">
+            <a:avLst/>
+          </a:prstGeom>
+          <a:solidFill>
+            <a:schemeClr val="accent6">
+              <a:lumMod val="20000"/>
+              <a:lumOff val="80000"/>
+            </a:schemeClr>
+          </a:solidFill>
+          <a:ln>
+            <a:solidFill>
+              <a:schemeClr val="accent6">
+                <a:lumMod val="75000"/>
+              </a:schemeClr>
+            </a:solidFill>
+          </a:ln>
+        </p:spPr>
+        <p:style>
+          <a:lnRef idx="2">
+            <a:schemeClr val="accent1">
+              <a:shade val="50000"/>
+            </a:schemeClr>
+          </a:lnRef>
+          <a:fillRef idx="1">
+            <a:schemeClr val="accent1"/>
+          </a:fillRef>
+          <a:effectRef idx="0">
+            <a:schemeClr val="accent1"/>
+          </a:effectRef>
+          <a:fontRef idx="minor">
+            <a:schemeClr val="lt1"/>
+          </a:fontRef>
+        </p:style>
+        <p:txBody>
+          <a:bodyPr rtlCol="0" anchor="ctr"/>
+          <a:lstStyle/>
+          <a:p>
+            <a:pPr algn="ctr"/>
+            <a:r>
+              <a:rPr lang="de-DE" b="1" dirty="0">
+                <a:solidFill>
+                  <a:schemeClr val="accent6">
+                    <a:lumMod val="75000"/>
+                  </a:schemeClr>
+                </a:solidFill>
+              </a:rPr>
+              <a:t>u</a:t>
+            </a:r>
+            <a:r>
+              <a:rPr lang="de-DE" b="1" dirty="0" smtClean="0">
+                <a:solidFill>
+                  <a:schemeClr val="accent6">
+                    <a:lumMod val="75000"/>
+                  </a:schemeClr>
+                </a:solidFill>
+              </a:rPr>
+              <a:t>pdate</a:t>
+            </a:r>
+            <a:endParaRPr lang="de-DE" b="1" dirty="0">
+              <a:solidFill>
+                <a:schemeClr val="accent6">
+                  <a:lumMod val="75000"/>
+                </a:schemeClr>
+              </a:solidFill>
+            </a:endParaRPr>
+          </a:p>
+        </p:txBody>
+      </p:sp>
+      <p:sp>
+        <p:nvSpPr>
+          <p:cNvPr id="7" name="Horizontaler Bildlauf 6"/>
+          <p:cNvSpPr/>
+          <p:nvPr/>
+        </p:nvSpPr>
+        <p:spPr>
+          <a:xfrm>
+            <a:off x="4879172" y="2775501"/>
+            <a:ext cx="1068394" cy="425510"/>
+          </a:xfrm>
+          <a:prstGeom prst="horizontalScroll">
+            <a:avLst/>
+          </a:prstGeom>
+          <a:solidFill>
+            <a:schemeClr val="bg1"/>
+          </a:solidFill>
+        </p:spPr>
+        <p:style>
+          <a:lnRef idx="2">
+            <a:schemeClr val="accent1">
+              <a:shade val="50000"/>
+            </a:schemeClr>
+          </a:lnRef>
+          <a:fillRef idx="1">
+            <a:schemeClr val="accent1"/>
+          </a:fillRef>
+          <a:effectRef idx="0">
+            <a:schemeClr val="accent1"/>
+          </a:effectRef>
+          <a:fontRef idx="minor">
+            <a:schemeClr val="lt1"/>
+          </a:fontRef>
+        </p:style>
+        <p:txBody>
+          <a:bodyPr rtlCol="0" anchor="ctr"/>
+          <a:lstStyle/>
+          <a:p>
+            <a:pPr algn="ctr"/>
+            <a:r>
+              <a:rPr lang="de-DE" sz="800" dirty="0" smtClean="0">
+                <a:solidFill>
+                  <a:schemeClr val="tx1"/>
+                </a:solidFill>
+                <a:latin typeface="Consolas" panose="020B0609020204030204" pitchFamily="49" charset="0"/>
+              </a:rPr>
+              <a:t>Tick</a:t>
+            </a:r>
+            <a:endParaRPr lang="de-DE" sz="800" dirty="0">
+              <a:solidFill>
+                <a:schemeClr val="tx1"/>
+              </a:solidFill>
+              <a:latin typeface="Consolas" panose="020B0609020204030204" pitchFamily="49" charset="0"/>
+            </a:endParaRPr>
+          </a:p>
+        </p:txBody>
+      </p:sp>
+      <p:cxnSp>
+        <p:nvCxnSpPr>
+          <p:cNvPr id="8" name="Gekrümmte Verbindung 7"/>
+          <p:cNvCxnSpPr>
+            <a:stCxn id="2" idx="1"/>
+            <a:endCxn id="7" idx="0"/>
+          </p:cNvCxnSpPr>
+          <p:nvPr/>
+        </p:nvCxnSpPr>
+        <p:spPr>
+          <a:xfrm rot="5400000">
+            <a:off x="5540786" y="2235050"/>
+            <a:ext cx="466224" cy="721057"/>
+          </a:xfrm>
+          <a:prstGeom prst="curvedConnector3">
+            <a:avLst>
+              <a:gd name="adj1" fmla="val 33783"/>
+            </a:avLst>
+          </a:prstGeom>
+          <a:ln>
+            <a:tailEnd type="triangle"/>
+          </a:ln>
+        </p:spPr>
+        <p:style>
+          <a:lnRef idx="1">
+            <a:schemeClr val="accent1"/>
+          </a:lnRef>
+          <a:fillRef idx="0">
+            <a:schemeClr val="accent1"/>
+          </a:fillRef>
+          <a:effectRef idx="0">
+            <a:schemeClr val="accent1"/>
+          </a:effectRef>
+          <a:fontRef idx="minor">
+            <a:schemeClr val="tx1"/>
+          </a:fontRef>
+        </p:style>
+      </p:cxnSp>
+      <p:cxnSp>
+        <p:nvCxnSpPr>
+          <p:cNvPr id="9" name="Gerade Verbindung mit Pfeil 8"/>
+          <p:cNvCxnSpPr>
+            <a:stCxn id="7" idx="2"/>
+            <a:endCxn id="6" idx="0"/>
+          </p:cNvCxnSpPr>
+          <p:nvPr/>
+        </p:nvCxnSpPr>
+        <p:spPr>
+          <a:xfrm>
+            <a:off x="5413369" y="3147822"/>
+            <a:ext cx="1" cy="190914"/>
+          </a:xfrm>
+          <a:prstGeom prst="straightConnector1">
+            <a:avLst/>
+          </a:prstGeom>
+          <a:ln w="12700">
+            <a:tailEnd type="triangle"/>
+          </a:ln>
+        </p:spPr>
+        <p:style>
+          <a:lnRef idx="1">
+            <a:schemeClr val="dk1"/>
+          </a:lnRef>
+          <a:fillRef idx="0">
+            <a:schemeClr val="dk1"/>
+          </a:fillRef>
+          <a:effectRef idx="0">
+            <a:schemeClr val="dk1"/>
+          </a:effectRef>
+          <a:fontRef idx="minor">
+            <a:schemeClr val="tx1"/>
+          </a:fontRef>
+        </p:style>
+      </p:cxnSp>
+      <p:cxnSp>
+        <p:nvCxnSpPr>
+          <p:cNvPr id="10" name="Gerade Verbindung mit Pfeil 9"/>
+          <p:cNvCxnSpPr>
+            <a:stCxn id="6" idx="3"/>
+            <a:endCxn id="11" idx="1"/>
+          </p:cNvCxnSpPr>
+          <p:nvPr/>
+        </p:nvCxnSpPr>
+        <p:spPr>
+          <a:xfrm>
+            <a:off x="6342057" y="3786411"/>
+            <a:ext cx="577355" cy="0"/>
+          </a:xfrm>
+          <a:prstGeom prst="straightConnector1">
+            <a:avLst/>
+          </a:prstGeom>
+          <a:ln w="12700">
+            <a:tailEnd type="triangle"/>
+          </a:ln>
+        </p:spPr>
+        <p:style>
+          <a:lnRef idx="1">
+            <a:schemeClr val="dk1"/>
+          </a:lnRef>
+          <a:fillRef idx="0">
+            <a:schemeClr val="dk1"/>
+          </a:fillRef>
+          <a:effectRef idx="0">
+            <a:schemeClr val="dk1"/>
+          </a:effectRef>
+          <a:fontRef idx="minor">
+            <a:schemeClr val="tx1"/>
+          </a:fontRef>
+        </p:style>
+      </p:cxnSp>
+      <p:sp>
+        <p:nvSpPr>
+          <p:cNvPr id="11" name="Geschweifte Klammer links/rechts 10"/>
+          <p:cNvSpPr/>
+          <p:nvPr/>
+        </p:nvSpPr>
+        <p:spPr>
+          <a:xfrm>
+            <a:off x="6919412" y="3477062"/>
+            <a:ext cx="1041487" cy="618698"/>
+          </a:xfrm>
+          <a:prstGeom prst="bracePair">
+            <a:avLst>
+              <a:gd name="adj" fmla="val 9437"/>
+            </a:avLst>
+          </a:prstGeom>
+        </p:spPr>
+        <p:style>
+          <a:lnRef idx="1">
+            <a:schemeClr val="accent1"/>
+          </a:lnRef>
+          <a:fillRef idx="0">
+            <a:schemeClr val="accent1"/>
+          </a:fillRef>
+          <a:effectRef idx="0">
+            <a:schemeClr val="accent1"/>
+          </a:effectRef>
+          <a:fontRef idx="minor">
+            <a:schemeClr val="tx1"/>
+          </a:fontRef>
+        </p:style>
+        <p:txBody>
+          <a:bodyPr rtlCol="0" anchor="ctr"/>
+          <a:lstStyle/>
+          <a:p>
+            <a:r>
+              <a:rPr lang="de-DE" sz="1400" b="1" dirty="0" smtClean="0"/>
+              <a:t>…</a:t>
+            </a:r>
+            <a:endParaRPr lang="de-DE" sz="1400" b="1" dirty="0"/>
+          </a:p>
+        </p:txBody>
+      </p:sp>
+      <p:cxnSp>
+        <p:nvCxnSpPr>
+          <p:cNvPr id="12" name="Gekrümmte Verbindung 11"/>
+          <p:cNvCxnSpPr>
+            <a:endCxn id="2" idx="0"/>
+          </p:cNvCxnSpPr>
+          <p:nvPr/>
+        </p:nvCxnSpPr>
+        <p:spPr>
+          <a:xfrm rot="16200000" flipV="1">
+            <a:off x="6491096" y="2528003"/>
+            <a:ext cx="1839858" cy="58260"/>
+          </a:xfrm>
+          <a:prstGeom prst="curvedConnector2">
+            <a:avLst/>
+          </a:prstGeom>
+          <a:ln>
+            <a:tailEnd type="triangle"/>
+          </a:ln>
+        </p:spPr>
+        <p:style>
+          <a:lnRef idx="1">
+            <a:schemeClr val="accent1"/>
+          </a:lnRef>
+          <a:fillRef idx="0">
+            <a:schemeClr val="accent1"/>
+          </a:fillRef>
+          <a:effectRef idx="0">
+            <a:schemeClr val="accent1"/>
+          </a:effectRef>
+          <a:fontRef idx="minor">
+            <a:schemeClr val="tx1"/>
+          </a:fontRef>
+        </p:style>
+      </p:cxnSp>
+      <p:cxnSp>
+        <p:nvCxnSpPr>
+          <p:cNvPr id="14" name="Gekrümmte Verbindung 13"/>
+          <p:cNvCxnSpPr>
+            <a:stCxn id="2" idx="2"/>
+            <a:endCxn id="3" idx="1"/>
+          </p:cNvCxnSpPr>
+          <p:nvPr/>
+        </p:nvCxnSpPr>
+        <p:spPr>
+          <a:xfrm rot="10800000" flipV="1">
+            <a:off x="2714126" y="1637203"/>
+            <a:ext cx="2178501" cy="2149207"/>
+          </a:xfrm>
+          <a:prstGeom prst="curvedConnector3">
+            <a:avLst>
+              <a:gd name="adj1" fmla="val 109181"/>
+            </a:avLst>
+          </a:prstGeom>
+          <a:ln>
+            <a:tailEnd type="triangle"/>
+          </a:ln>
+        </p:spPr>
+        <p:style>
+          <a:lnRef idx="1">
+            <a:schemeClr val="accent1"/>
+          </a:lnRef>
+          <a:fillRef idx="0">
+            <a:schemeClr val="accent1"/>
+          </a:fillRef>
+          <a:effectRef idx="0">
+            <a:schemeClr val="accent1"/>
+          </a:effectRef>
+          <a:fontRef idx="minor">
+            <a:schemeClr val="tx1"/>
+          </a:fontRef>
+        </p:style>
+      </p:cxnSp>
+      <p:sp>
+        <p:nvSpPr>
+          <p:cNvPr id="16" name="Geschweifte Klammer links/rechts 15"/>
+          <p:cNvSpPr/>
+          <p:nvPr/>
+        </p:nvSpPr>
+        <p:spPr>
+          <a:xfrm>
+            <a:off x="1904500" y="800537"/>
+            <a:ext cx="538663" cy="375801"/>
+          </a:xfrm>
+          <a:prstGeom prst="bracePair">
+            <a:avLst>
+              <a:gd name="adj" fmla="val 9437"/>
+            </a:avLst>
+          </a:prstGeom>
+        </p:spPr>
+        <p:style>
+          <a:lnRef idx="1">
+            <a:schemeClr val="accent1"/>
+          </a:lnRef>
+          <a:fillRef idx="0">
+            <a:schemeClr val="accent1"/>
+          </a:fillRef>
+          <a:effectRef idx="0">
+            <a:schemeClr val="accent1"/>
+          </a:effectRef>
+          <a:fontRef idx="minor">
+            <a:schemeClr val="tx1"/>
+          </a:fontRef>
+        </p:style>
+        <p:txBody>
+          <a:bodyPr rtlCol="0" anchor="ctr"/>
+          <a:lstStyle/>
+          <a:p>
+            <a:r>
+              <a:rPr lang="de-DE" sz="1400" b="1" dirty="0" smtClean="0"/>
+              <a:t>…</a:t>
+            </a:r>
+            <a:endParaRPr lang="de-DE" sz="1400" b="1" dirty="0"/>
+          </a:p>
+        </p:txBody>
+      </p:sp>
+      <p:sp>
+        <p:nvSpPr>
+          <p:cNvPr id="17" name="Rechteck 16"/>
+          <p:cNvSpPr/>
+          <p:nvPr/>
+        </p:nvSpPr>
+        <p:spPr>
+          <a:xfrm>
+            <a:off x="2884483" y="786726"/>
+            <a:ext cx="1082680" cy="403421"/>
+          </a:xfrm>
+          <a:prstGeom prst="rect">
+            <a:avLst/>
+          </a:prstGeom>
+          <a:solidFill>
+            <a:schemeClr val="accent6">
+              <a:lumMod val="20000"/>
+              <a:lumOff val="80000"/>
+            </a:schemeClr>
+          </a:solidFill>
+          <a:ln>
+            <a:solidFill>
+              <a:schemeClr val="accent6">
+                <a:lumMod val="75000"/>
+              </a:schemeClr>
+            </a:solidFill>
+          </a:ln>
+        </p:spPr>
+        <p:style>
+          <a:lnRef idx="2">
+            <a:schemeClr val="accent1">
+              <a:shade val="50000"/>
+            </a:schemeClr>
+          </a:lnRef>
+          <a:fillRef idx="1">
+            <a:schemeClr val="accent1"/>
+          </a:fillRef>
+          <a:effectRef idx="0">
+            <a:schemeClr val="accent1"/>
+          </a:effectRef>
+          <a:fontRef idx="minor">
+            <a:schemeClr val="lt1"/>
+          </a:fontRef>
+        </p:style>
+        <p:txBody>
+          <a:bodyPr rtlCol="0" anchor="ctr"/>
+          <a:lstStyle/>
+          <a:p>
+            <a:pPr algn="ctr"/>
+            <a:r>
+              <a:rPr lang="de-DE" b="1" dirty="0" err="1" smtClean="0">
+                <a:solidFill>
+                  <a:schemeClr val="accent6">
+                    <a:lumMod val="75000"/>
+                  </a:schemeClr>
+                </a:solidFill>
+              </a:rPr>
+              <a:t>subscribe</a:t>
+            </a:r>
+            <a:endParaRPr lang="de-DE" b="1" dirty="0">
+              <a:solidFill>
+                <a:schemeClr val="accent6">
+                  <a:lumMod val="75000"/>
+                </a:schemeClr>
+              </a:solidFill>
+            </a:endParaRPr>
+          </a:p>
+        </p:txBody>
+      </p:sp>
+      <p:cxnSp>
+        <p:nvCxnSpPr>
+          <p:cNvPr id="18" name="Gerade Verbindung mit Pfeil 17"/>
+          <p:cNvCxnSpPr>
+            <a:stCxn id="16" idx="3"/>
+            <a:endCxn id="17" idx="1"/>
+          </p:cNvCxnSpPr>
+          <p:nvPr/>
+        </p:nvCxnSpPr>
+        <p:spPr>
+          <a:xfrm flipV="1">
+            <a:off x="2443163" y="988437"/>
+            <a:ext cx="441320" cy="1"/>
+          </a:xfrm>
+          <a:prstGeom prst="straightConnector1">
+            <a:avLst/>
+          </a:prstGeom>
+          <a:ln w="12700">
+            <a:tailEnd type="triangle"/>
+          </a:ln>
+        </p:spPr>
+        <p:style>
+          <a:lnRef idx="1">
+            <a:schemeClr val="dk1"/>
+          </a:lnRef>
+          <a:fillRef idx="0">
+            <a:schemeClr val="dk1"/>
+          </a:fillRef>
+          <a:effectRef idx="0">
+            <a:schemeClr val="dk1"/>
+          </a:effectRef>
+          <a:fontRef idx="minor">
+            <a:schemeClr val="tx1"/>
+          </a:fontRef>
+        </p:style>
+      </p:cxnSp>
+      <p:cxnSp>
+        <p:nvCxnSpPr>
+          <p:cNvPr id="21" name="Gekrümmte Verbindung 20"/>
+          <p:cNvCxnSpPr>
+            <a:stCxn id="17" idx="3"/>
+            <a:endCxn id="2" idx="3"/>
+          </p:cNvCxnSpPr>
+          <p:nvPr/>
+        </p:nvCxnSpPr>
+        <p:spPr>
+          <a:xfrm>
+            <a:off x="3967163" y="988437"/>
+            <a:ext cx="2167263" cy="5069"/>
+          </a:xfrm>
+          <a:prstGeom prst="curvedConnector4">
+            <a:avLst>
+              <a:gd name="adj1" fmla="val 21172"/>
+              <a:gd name="adj2" fmla="val -8489071"/>
+            </a:avLst>
+          </a:prstGeom>
+          <a:ln>
+            <a:tailEnd type="triangle"/>
+          </a:ln>
+        </p:spPr>
+        <p:style>
+          <a:lnRef idx="1">
+            <a:schemeClr val="accent1"/>
+          </a:lnRef>
+          <a:fillRef idx="0">
+            <a:schemeClr val="accent1"/>
+          </a:fillRef>
+          <a:effectRef idx="0">
+            <a:schemeClr val="accent1"/>
+          </a:effectRef>
+          <a:fontRef idx="minor">
+            <a:schemeClr val="tx1"/>
+          </a:fontRef>
+        </p:style>
+      </p:cxnSp>
+      <p:sp>
+        <p:nvSpPr>
+          <p:cNvPr id="24" name="Doppelte Welle 23"/>
+          <p:cNvSpPr/>
+          <p:nvPr/>
+        </p:nvSpPr>
+        <p:spPr>
+          <a:xfrm>
+            <a:off x="4287906" y="553275"/>
+            <a:ext cx="666634" cy="266563"/>
+          </a:xfrm>
+          <a:prstGeom prst="doubleWave">
+            <a:avLst/>
+          </a:prstGeom>
+          <a:solidFill>
+            <a:schemeClr val="accent4">
+              <a:lumMod val="20000"/>
+              <a:lumOff val="80000"/>
+            </a:schemeClr>
+          </a:solidFill>
+          <a:ln>
+            <a:solidFill>
+              <a:schemeClr val="accent4">
+                <a:lumMod val="60000"/>
+                <a:lumOff val="40000"/>
+              </a:schemeClr>
+            </a:solidFill>
+          </a:ln>
+        </p:spPr>
+        <p:style>
+          <a:lnRef idx="2">
+            <a:schemeClr val="accent1">
+              <a:shade val="50000"/>
+            </a:schemeClr>
+          </a:lnRef>
+          <a:fillRef idx="1">
+            <a:schemeClr val="accent1"/>
+          </a:fillRef>
+          <a:effectRef idx="0">
+            <a:schemeClr val="accent1"/>
+          </a:effectRef>
+          <a:fontRef idx="minor">
+            <a:schemeClr val="lt1"/>
+          </a:fontRef>
+        </p:style>
+        <p:txBody>
+          <a:bodyPr rtlCol="0" anchor="ctr"/>
+          <a:lstStyle/>
+          <a:p>
+            <a:pPr algn="ctr"/>
+            <a:r>
+              <a:rPr lang="de-DE" sz="700" dirty="0" smtClean="0">
+                <a:solidFill>
+                  <a:schemeClr val="accent4">
+                    <a:lumMod val="75000"/>
+                  </a:schemeClr>
+                </a:solidFill>
+                <a:latin typeface="Consolas" panose="020B0609020204030204" pitchFamily="49" charset="0"/>
+              </a:rPr>
+              <a:t>Sub </a:t>
+            </a:r>
+            <a:r>
+              <a:rPr lang="de-DE" sz="700" dirty="0" err="1" smtClean="0">
+                <a:solidFill>
+                  <a:schemeClr val="accent4">
+                    <a:lumMod val="75000"/>
+                  </a:schemeClr>
+                </a:solidFill>
+                <a:latin typeface="Consolas" panose="020B0609020204030204" pitchFamily="49" charset="0"/>
+              </a:rPr>
+              <a:t>Msg</a:t>
+            </a:r>
+            <a:endParaRPr lang="de-DE" sz="700" dirty="0">
+              <a:solidFill>
+                <a:schemeClr val="accent4">
+                  <a:lumMod val="75000"/>
+                </a:schemeClr>
+              </a:solidFill>
+              <a:latin typeface="Consolas" panose="020B0609020204030204" pitchFamily="49" charset="0"/>
+            </a:endParaRPr>
+          </a:p>
+        </p:txBody>
+      </p:sp>
+    </p:spTree>
+    <p:extLst>
+      <p:ext uri="{BB962C8B-B14F-4D97-AF65-F5344CB8AC3E}">
+        <p14:creationId xmlns:p14="http://schemas.microsoft.com/office/powerpoint/2010/main" val="1024373277"/>
+      </p:ext>
+    </p:extLst>
+  </p:cSld>
+  <p:clrMapOvr>
+    <a:masterClrMapping/>
+  </p:clrMapOvr>
+</p:sld>
+</file>
+
+<file path=ppt/slides/slide5.xml><?xml version="1.0" encoding="utf-8"?>
+<p:sld xmlns:a="http://schemas.openxmlformats.org/drawingml/2006/main" xmlns:r="http://schemas.openxmlformats.org/officeDocument/2006/relationships" xmlns:p="http://schemas.openxmlformats.org/presentationml/2006/main">
+  <p:cSld>
+    <p:spTree>
+      <p:nvGrpSpPr>
+        <p:cNvPr id="1" name=""/>
+        <p:cNvGrpSpPr/>
+        <p:nvPr/>
+      </p:nvGrpSpPr>
+      <p:grpSpPr>
+        <a:xfrm>
+          <a:off x="0" y="0"/>
+          <a:ext cx="0" cy="0"/>
+          <a:chOff x="0" y="0"/>
+          <a:chExt cx="0" cy="0"/>
+        </a:xfrm>
+      </p:grpSpPr>
+      <p:sp>
+        <p:nvSpPr>
+          <p:cNvPr id="2" name="Wolke 1"/>
+          <p:cNvSpPr/>
+          <p:nvPr/>
+        </p:nvSpPr>
+        <p:spPr>
+          <a:xfrm>
+            <a:off x="4884874" y="910394"/>
+            <a:ext cx="2499104" cy="1453620"/>
+          </a:xfrm>
+          <a:prstGeom prst="cloud">
+            <a:avLst/>
+          </a:prstGeom>
+          <a:solidFill>
+            <a:schemeClr val="accent1">
+              <a:lumMod val="20000"/>
+              <a:lumOff val="80000"/>
+            </a:schemeClr>
+          </a:solidFill>
+        </p:spPr>
+        <p:style>
+          <a:lnRef idx="2">
+            <a:schemeClr val="accent1">
+              <a:shade val="50000"/>
+            </a:schemeClr>
+          </a:lnRef>
+          <a:fillRef idx="1">
+            <a:schemeClr val="accent1"/>
+          </a:fillRef>
+          <a:effectRef idx="0">
+            <a:schemeClr val="accent1"/>
+          </a:effectRef>
+          <a:fontRef idx="minor">
+            <a:schemeClr val="lt1"/>
+          </a:fontRef>
+        </p:style>
+        <p:txBody>
+          <a:bodyPr rtlCol="0" anchor="ctr"/>
+          <a:lstStyle/>
+          <a:p>
+            <a:pPr algn="ctr"/>
+            <a:r>
+              <a:rPr lang="de-DE" b="1" dirty="0" smtClean="0">
+                <a:solidFill>
+                  <a:schemeClr val="accent1">
+                    <a:lumMod val="75000"/>
+                  </a:schemeClr>
+                </a:solidFill>
+              </a:rPr>
+              <a:t>Elm </a:t>
+            </a:r>
+            <a:r>
+              <a:rPr lang="de-DE" dirty="0" err="1" smtClean="0">
+                <a:solidFill>
+                  <a:schemeClr val="accent1">
+                    <a:lumMod val="75000"/>
+                  </a:schemeClr>
+                </a:solidFill>
+              </a:rPr>
+              <a:t>Runtime</a:t>
+            </a:r>
+            <a:endParaRPr lang="de-DE" b="1" dirty="0">
+              <a:solidFill>
+                <a:schemeClr val="accent1">
+                  <a:lumMod val="75000"/>
+                </a:schemeClr>
+              </a:solidFill>
+            </a:endParaRPr>
+          </a:p>
+        </p:txBody>
+      </p:sp>
+      <p:sp>
+        <p:nvSpPr>
+          <p:cNvPr id="3" name="Geschweifte Klammer links/rechts 2"/>
+          <p:cNvSpPr/>
+          <p:nvPr/>
+        </p:nvSpPr>
+        <p:spPr>
+          <a:xfrm>
+            <a:off x="2714125" y="3477062"/>
+            <a:ext cx="1041487" cy="618698"/>
+          </a:xfrm>
+          <a:prstGeom prst="bracePair">
+            <a:avLst>
+              <a:gd name="adj" fmla="val 9437"/>
+            </a:avLst>
+          </a:prstGeom>
+        </p:spPr>
+        <p:style>
+          <a:lnRef idx="1">
+            <a:schemeClr val="accent1"/>
+          </a:lnRef>
+          <a:fillRef idx="0">
+            <a:schemeClr val="accent1"/>
+          </a:fillRef>
+          <a:effectRef idx="0">
+            <a:schemeClr val="accent1"/>
+          </a:effectRef>
+          <a:fontRef idx="minor">
+            <a:schemeClr val="tx1"/>
+          </a:fontRef>
+        </p:style>
+        <p:txBody>
+          <a:bodyPr rtlCol="0" anchor="ctr"/>
+          <a:lstStyle/>
+          <a:p>
+            <a:endParaRPr lang="de-DE" sz="1400" b="1" dirty="0"/>
+          </a:p>
+        </p:txBody>
+      </p:sp>
+      <p:cxnSp>
+        <p:nvCxnSpPr>
+          <p:cNvPr id="5" name="Gerade Verbindung mit Pfeil 4"/>
+          <p:cNvCxnSpPr>
+            <a:stCxn id="3" idx="3"/>
+            <a:endCxn id="7" idx="1"/>
+          </p:cNvCxnSpPr>
+          <p:nvPr/>
+        </p:nvCxnSpPr>
+        <p:spPr>
+          <a:xfrm>
+            <a:off x="3755612" y="3786411"/>
+            <a:ext cx="729070" cy="0"/>
+          </a:xfrm>
+          <a:prstGeom prst="straightConnector1">
+            <a:avLst/>
+          </a:prstGeom>
+          <a:ln w="12700">
+            <a:tailEnd type="triangle"/>
+          </a:ln>
+        </p:spPr>
+        <p:style>
+          <a:lnRef idx="1">
+            <a:schemeClr val="dk1"/>
+          </a:lnRef>
+          <a:fillRef idx="0">
+            <a:schemeClr val="dk1"/>
+          </a:fillRef>
+          <a:effectRef idx="0">
+            <a:schemeClr val="dk1"/>
+          </a:effectRef>
+          <a:fontRef idx="minor">
+            <a:schemeClr val="tx1"/>
+          </a:fontRef>
+        </p:style>
+      </p:cxnSp>
+      <p:cxnSp>
+        <p:nvCxnSpPr>
+          <p:cNvPr id="6" name="Gekrümmte Verbindung 5"/>
+          <p:cNvCxnSpPr>
+            <a:stCxn id="14" idx="3"/>
+            <a:endCxn id="2" idx="3"/>
+          </p:cNvCxnSpPr>
+          <p:nvPr/>
+        </p:nvCxnSpPr>
+        <p:spPr>
+          <a:xfrm flipV="1">
+            <a:off x="4003938" y="993506"/>
+            <a:ext cx="2130488" cy="368247"/>
+          </a:xfrm>
+          <a:prstGeom prst="curvedConnector4">
+            <a:avLst>
+              <a:gd name="adj1" fmla="val 20675"/>
+              <a:gd name="adj2" fmla="val 211859"/>
+            </a:avLst>
+          </a:prstGeom>
+          <a:ln>
+            <a:tailEnd type="triangle"/>
+          </a:ln>
+        </p:spPr>
+        <p:style>
+          <a:lnRef idx="1">
+            <a:schemeClr val="accent1"/>
+          </a:lnRef>
+          <a:fillRef idx="0">
+            <a:schemeClr val="accent1"/>
+          </a:fillRef>
+          <a:effectRef idx="0">
+            <a:schemeClr val="accent1"/>
+          </a:effectRef>
+          <a:fontRef idx="minor">
+            <a:schemeClr val="tx1"/>
+          </a:fontRef>
+        </p:style>
+      </p:cxnSp>
+      <p:sp>
+        <p:nvSpPr>
+          <p:cNvPr id="7" name="Rechteck 6"/>
+          <p:cNvSpPr/>
+          <p:nvPr/>
+        </p:nvSpPr>
+        <p:spPr>
+          <a:xfrm>
+            <a:off x="4484682" y="3338736"/>
+            <a:ext cx="1857375" cy="895350"/>
+          </a:xfrm>
+          <a:prstGeom prst="rect">
+            <a:avLst/>
+          </a:prstGeom>
+          <a:solidFill>
+            <a:schemeClr val="accent6">
+              <a:lumMod val="20000"/>
+              <a:lumOff val="80000"/>
+            </a:schemeClr>
+          </a:solidFill>
+          <a:ln>
+            <a:solidFill>
+              <a:schemeClr val="accent6">
+                <a:lumMod val="75000"/>
+              </a:schemeClr>
+            </a:solidFill>
+          </a:ln>
+        </p:spPr>
+        <p:style>
+          <a:lnRef idx="2">
+            <a:schemeClr val="accent1">
+              <a:shade val="50000"/>
+            </a:schemeClr>
+          </a:lnRef>
+          <a:fillRef idx="1">
+            <a:schemeClr val="accent1"/>
+          </a:fillRef>
+          <a:effectRef idx="0">
+            <a:schemeClr val="accent1"/>
+          </a:effectRef>
+          <a:fontRef idx="minor">
+            <a:schemeClr val="lt1"/>
+          </a:fontRef>
+        </p:style>
+        <p:txBody>
+          <a:bodyPr rtlCol="0" anchor="ctr"/>
+          <a:lstStyle/>
+          <a:p>
+            <a:pPr algn="ctr"/>
+            <a:r>
+              <a:rPr lang="de-DE" b="1" dirty="0">
+                <a:solidFill>
+                  <a:schemeClr val="accent6">
+                    <a:lumMod val="75000"/>
+                  </a:schemeClr>
+                </a:solidFill>
+              </a:rPr>
+              <a:t>u</a:t>
+            </a:r>
+            <a:r>
+              <a:rPr lang="de-DE" b="1" dirty="0" smtClean="0">
+                <a:solidFill>
+                  <a:schemeClr val="accent6">
+                    <a:lumMod val="75000"/>
+                  </a:schemeClr>
+                </a:solidFill>
+              </a:rPr>
+              <a:t>pdate</a:t>
+            </a:r>
+            <a:endParaRPr lang="de-DE" b="1" dirty="0">
+              <a:solidFill>
+                <a:schemeClr val="accent6">
+                  <a:lumMod val="75000"/>
+                </a:schemeClr>
+              </a:solidFill>
+            </a:endParaRPr>
+          </a:p>
+        </p:txBody>
+      </p:sp>
+      <p:sp>
+        <p:nvSpPr>
+          <p:cNvPr id="8" name="Horizontaler Bildlauf 7"/>
+          <p:cNvSpPr/>
+          <p:nvPr/>
+        </p:nvSpPr>
+        <p:spPr>
+          <a:xfrm>
+            <a:off x="4879172" y="2775501"/>
+            <a:ext cx="1068394" cy="425510"/>
+          </a:xfrm>
+          <a:prstGeom prst="horizontalScroll">
+            <a:avLst/>
+          </a:prstGeom>
+          <a:solidFill>
+            <a:schemeClr val="bg1"/>
+          </a:solidFill>
+        </p:spPr>
+        <p:style>
+          <a:lnRef idx="2">
+            <a:schemeClr val="accent1">
+              <a:shade val="50000"/>
+            </a:schemeClr>
+          </a:lnRef>
+          <a:fillRef idx="1">
+            <a:schemeClr val="accent1"/>
+          </a:fillRef>
+          <a:effectRef idx="0">
+            <a:schemeClr val="accent1"/>
+          </a:effectRef>
+          <a:fontRef idx="minor">
+            <a:schemeClr val="lt1"/>
+          </a:fontRef>
+        </p:style>
+        <p:txBody>
+          <a:bodyPr rtlCol="0" anchor="ctr"/>
+          <a:lstStyle/>
+          <a:p>
+            <a:pPr algn="ctr"/>
+            <a:r>
+              <a:rPr lang="de-DE" sz="800" dirty="0" err="1" smtClean="0">
+                <a:solidFill>
+                  <a:schemeClr val="tx1"/>
+                </a:solidFill>
+                <a:latin typeface="Consolas" panose="020B0609020204030204" pitchFamily="49" charset="0"/>
+              </a:rPr>
+              <a:t>GotItems</a:t>
+            </a:r>
+            <a:r>
+              <a:rPr lang="de-DE" sz="800" dirty="0" smtClean="0">
+                <a:solidFill>
+                  <a:schemeClr val="tx1"/>
+                </a:solidFill>
+                <a:latin typeface="Consolas" panose="020B0609020204030204" pitchFamily="49" charset="0"/>
+              </a:rPr>
+              <a:t> [</a:t>
+            </a:r>
+            <a:r>
+              <a:rPr lang="de-DE" sz="800" dirty="0" err="1" smtClean="0">
+                <a:solidFill>
+                  <a:schemeClr val="tx1"/>
+                </a:solidFill>
+                <a:latin typeface="Consolas" panose="020B0609020204030204" pitchFamily="49" charset="0"/>
+              </a:rPr>
+              <a:t>Grün,Blau</a:t>
+            </a:r>
+            <a:r>
+              <a:rPr lang="de-DE" sz="800" dirty="0" smtClean="0">
+                <a:solidFill>
+                  <a:schemeClr val="tx1"/>
+                </a:solidFill>
+                <a:latin typeface="Consolas" panose="020B0609020204030204" pitchFamily="49" charset="0"/>
+              </a:rPr>
+              <a:t>]</a:t>
+            </a:r>
+            <a:endParaRPr lang="de-DE" sz="800" dirty="0">
+              <a:solidFill>
+                <a:schemeClr val="tx1"/>
+              </a:solidFill>
+              <a:latin typeface="Consolas" panose="020B0609020204030204" pitchFamily="49" charset="0"/>
+            </a:endParaRPr>
+          </a:p>
+        </p:txBody>
+      </p:sp>
+      <p:cxnSp>
+        <p:nvCxnSpPr>
+          <p:cNvPr id="9" name="Gekrümmte Verbindung 8"/>
+          <p:cNvCxnSpPr>
+            <a:stCxn id="2" idx="1"/>
+            <a:endCxn id="8" idx="0"/>
+          </p:cNvCxnSpPr>
+          <p:nvPr/>
+        </p:nvCxnSpPr>
+        <p:spPr>
+          <a:xfrm rot="5400000">
+            <a:off x="5540786" y="2235050"/>
+            <a:ext cx="466224" cy="721057"/>
+          </a:xfrm>
+          <a:prstGeom prst="curvedConnector3">
+            <a:avLst>
+              <a:gd name="adj1" fmla="val 33783"/>
+            </a:avLst>
+          </a:prstGeom>
+          <a:ln>
+            <a:tailEnd type="triangle"/>
+          </a:ln>
+        </p:spPr>
+        <p:style>
+          <a:lnRef idx="1">
+            <a:schemeClr val="accent1"/>
+          </a:lnRef>
+          <a:fillRef idx="0">
+            <a:schemeClr val="accent1"/>
+          </a:fillRef>
+          <a:effectRef idx="0">
+            <a:schemeClr val="accent1"/>
+          </a:effectRef>
+          <a:fontRef idx="minor">
+            <a:schemeClr val="tx1"/>
+          </a:fontRef>
+        </p:style>
+      </p:cxnSp>
+      <p:cxnSp>
+        <p:nvCxnSpPr>
+          <p:cNvPr id="10" name="Gerade Verbindung mit Pfeil 9"/>
+          <p:cNvCxnSpPr>
+            <a:stCxn id="8" idx="2"/>
+            <a:endCxn id="7" idx="0"/>
+          </p:cNvCxnSpPr>
+          <p:nvPr/>
+        </p:nvCxnSpPr>
+        <p:spPr>
+          <a:xfrm>
+            <a:off x="5413369" y="3147822"/>
+            <a:ext cx="1" cy="190914"/>
+          </a:xfrm>
+          <a:prstGeom prst="straightConnector1">
+            <a:avLst/>
+          </a:prstGeom>
+          <a:ln w="12700">
+            <a:tailEnd type="triangle"/>
+          </a:ln>
+        </p:spPr>
+        <p:style>
+          <a:lnRef idx="1">
+            <a:schemeClr val="dk1"/>
+          </a:lnRef>
+          <a:fillRef idx="0">
+            <a:schemeClr val="dk1"/>
+          </a:fillRef>
+          <a:effectRef idx="0">
+            <a:schemeClr val="dk1"/>
+          </a:effectRef>
+          <a:fontRef idx="minor">
+            <a:schemeClr val="tx1"/>
+          </a:fontRef>
+        </p:style>
+      </p:cxnSp>
+      <p:cxnSp>
+        <p:nvCxnSpPr>
+          <p:cNvPr id="11" name="Gerade Verbindung mit Pfeil 10"/>
+          <p:cNvCxnSpPr>
+            <a:stCxn id="7" idx="3"/>
+            <a:endCxn id="12" idx="1"/>
+          </p:cNvCxnSpPr>
+          <p:nvPr/>
+        </p:nvCxnSpPr>
+        <p:spPr>
+          <a:xfrm>
+            <a:off x="6342057" y="3786411"/>
+            <a:ext cx="577355" cy="0"/>
+          </a:xfrm>
+          <a:prstGeom prst="straightConnector1">
+            <a:avLst/>
+          </a:prstGeom>
+          <a:ln w="12700">
+            <a:tailEnd type="triangle"/>
+          </a:ln>
+        </p:spPr>
+        <p:style>
+          <a:lnRef idx="1">
+            <a:schemeClr val="dk1"/>
+          </a:lnRef>
+          <a:fillRef idx="0">
+            <a:schemeClr val="dk1"/>
+          </a:fillRef>
+          <a:effectRef idx="0">
+            <a:schemeClr val="dk1"/>
+          </a:effectRef>
+          <a:fontRef idx="minor">
+            <a:schemeClr val="tx1"/>
+          </a:fontRef>
+        </p:style>
+      </p:cxnSp>
+      <p:sp>
+        <p:nvSpPr>
+          <p:cNvPr id="12" name="Geschweifte Klammer links/rechts 11"/>
+          <p:cNvSpPr/>
+          <p:nvPr/>
+        </p:nvSpPr>
+        <p:spPr>
+          <a:xfrm>
+            <a:off x="6919412" y="3477062"/>
+            <a:ext cx="1041487" cy="618698"/>
+          </a:xfrm>
+          <a:prstGeom prst="bracePair">
+            <a:avLst>
+              <a:gd name="adj" fmla="val 9437"/>
+            </a:avLst>
+          </a:prstGeom>
+        </p:spPr>
+        <p:style>
+          <a:lnRef idx="1">
+            <a:schemeClr val="accent1"/>
+          </a:lnRef>
+          <a:fillRef idx="0">
+            <a:schemeClr val="accent1"/>
+          </a:fillRef>
+          <a:effectRef idx="0">
+            <a:schemeClr val="accent1"/>
+          </a:effectRef>
+          <a:fontRef idx="minor">
+            <a:schemeClr val="tx1"/>
+          </a:fontRef>
+        </p:style>
+        <p:txBody>
+          <a:bodyPr rtlCol="0" anchor="ctr"/>
+          <a:lstStyle/>
+          <a:p>
+            <a:pPr marL="285750" indent="-285750">
+              <a:buFontTx/>
+              <a:buChar char="-"/>
+            </a:pPr>
+            <a:r>
+              <a:rPr lang="de-DE" sz="1400" b="1" dirty="0" smtClean="0"/>
+              <a:t>Grün</a:t>
+            </a:r>
+          </a:p>
+          <a:p>
+            <a:pPr marL="285750" indent="-285750">
+              <a:buFontTx/>
+              <a:buChar char="-"/>
+            </a:pPr>
+            <a:r>
+              <a:rPr lang="de-DE" sz="1400" b="1" dirty="0" smtClean="0"/>
+              <a:t>Blau</a:t>
+            </a:r>
+            <a:endParaRPr lang="de-DE" sz="1400" b="1" dirty="0"/>
+          </a:p>
+        </p:txBody>
+      </p:sp>
+      <p:cxnSp>
+        <p:nvCxnSpPr>
+          <p:cNvPr id="13" name="Gekrümmte Verbindung 12"/>
+          <p:cNvCxnSpPr>
+            <a:endCxn id="2" idx="0"/>
+          </p:cNvCxnSpPr>
+          <p:nvPr/>
+        </p:nvCxnSpPr>
+        <p:spPr>
+          <a:xfrm rot="16200000" flipV="1">
+            <a:off x="6491096" y="2528003"/>
+            <a:ext cx="1839858" cy="58260"/>
+          </a:xfrm>
+          <a:prstGeom prst="curvedConnector2">
+            <a:avLst/>
+          </a:prstGeom>
+          <a:ln>
+            <a:tailEnd type="triangle"/>
+          </a:ln>
+        </p:spPr>
+        <p:style>
+          <a:lnRef idx="1">
+            <a:schemeClr val="accent1"/>
+          </a:lnRef>
+          <a:fillRef idx="0">
+            <a:schemeClr val="accent1"/>
+          </a:fillRef>
+          <a:effectRef idx="0">
+            <a:schemeClr val="accent1"/>
+          </a:effectRef>
+          <a:fontRef idx="minor">
+            <a:schemeClr val="tx1"/>
+          </a:fontRef>
+        </p:style>
+      </p:cxnSp>
+      <p:sp>
+        <p:nvSpPr>
+          <p:cNvPr id="14" name="Explosion 1 13"/>
+          <p:cNvSpPr/>
+          <p:nvPr/>
+        </p:nvSpPr>
+        <p:spPr>
+          <a:xfrm>
+            <a:off x="2108463" y="810190"/>
+            <a:ext cx="1895475" cy="896445"/>
+          </a:xfrm>
+          <a:prstGeom prst="irregularSeal1">
+            <a:avLst/>
+          </a:prstGeom>
+          <a:solidFill>
+            <a:schemeClr val="accent4"/>
+          </a:solidFill>
+          <a:ln>
+            <a:solidFill>
+              <a:schemeClr val="accent4">
+                <a:lumMod val="50000"/>
+              </a:schemeClr>
+            </a:solidFill>
+          </a:ln>
+        </p:spPr>
+        <p:style>
+          <a:lnRef idx="2">
+            <a:schemeClr val="accent1">
+              <a:shade val="50000"/>
+            </a:schemeClr>
+          </a:lnRef>
+          <a:fillRef idx="1">
+            <a:schemeClr val="accent1"/>
+          </a:fillRef>
+          <a:effectRef idx="0">
+            <a:schemeClr val="accent1"/>
+          </a:effectRef>
+          <a:fontRef idx="minor">
+            <a:schemeClr val="lt1"/>
+          </a:fontRef>
+        </p:style>
+        <p:txBody>
+          <a:bodyPr rtlCol="0" anchor="ctr"/>
+          <a:lstStyle/>
+          <a:p>
+            <a:pPr algn="ctr"/>
+            <a:r>
+              <a:rPr lang="de-DE" dirty="0" err="1" smtClean="0">
+                <a:solidFill>
+                  <a:schemeClr val="accent4">
+                    <a:lumMod val="50000"/>
+                  </a:schemeClr>
+                </a:solidFill>
+              </a:rPr>
+              <a:t>getItems</a:t>
+            </a:r>
+            <a:endParaRPr lang="de-DE" dirty="0">
+              <a:solidFill>
+                <a:schemeClr val="accent4">
+                  <a:lumMod val="50000"/>
+                </a:schemeClr>
+              </a:solidFill>
+            </a:endParaRPr>
+          </a:p>
+        </p:txBody>
+      </p:sp>
+      <p:cxnSp>
+        <p:nvCxnSpPr>
+          <p:cNvPr id="17" name="Gekrümmte Verbindung 16"/>
+          <p:cNvCxnSpPr>
+            <a:stCxn id="2" idx="2"/>
+            <a:endCxn id="3" idx="1"/>
+          </p:cNvCxnSpPr>
+          <p:nvPr/>
+        </p:nvCxnSpPr>
+        <p:spPr>
+          <a:xfrm rot="10800000" flipV="1">
+            <a:off x="2714126" y="1637203"/>
+            <a:ext cx="2178501" cy="2149207"/>
+          </a:xfrm>
+          <a:prstGeom prst="curvedConnector3">
+            <a:avLst>
+              <a:gd name="adj1" fmla="val 109181"/>
+            </a:avLst>
+          </a:prstGeom>
+          <a:ln>
+            <a:tailEnd type="triangle"/>
+          </a:ln>
+        </p:spPr>
+        <p:style>
+          <a:lnRef idx="1">
+            <a:schemeClr val="accent1"/>
+          </a:lnRef>
+          <a:fillRef idx="0">
+            <a:schemeClr val="accent1"/>
+          </a:fillRef>
+          <a:effectRef idx="0">
+            <a:schemeClr val="accent1"/>
+          </a:effectRef>
+          <a:fontRef idx="minor">
+            <a:schemeClr val="tx1"/>
+          </a:fontRef>
+        </p:style>
+      </p:cxnSp>
+    </p:spTree>
+    <p:extLst>
+      <p:ext uri="{BB962C8B-B14F-4D97-AF65-F5344CB8AC3E}">
+        <p14:creationId xmlns:p14="http://schemas.microsoft.com/office/powerpoint/2010/main" val="3311180872"/>
+      </p:ext>
+    </p:extLst>
+  </p:cSld>
+  <p:clrMapOvr>
+    <a:masterClrMapping/>
+  </p:clrMapOvr>
+</p:sld>
+</file>
+
 <file path=ppt/theme/theme1.xml><?xml version="1.0" encoding="utf-8"?>
 <a:theme xmlns:a="http://schemas.openxmlformats.org/drawingml/2006/main" name="Office Theme">
   <a:themeElements>

</xml_diff>